<commit_message>
add_ functionality added to the workshop
</commit_message>
<xml_diff>
--- a/docs/ESM-Tools terminology.pptx
+++ b/docs/ESM-Tools terminology.pptx
@@ -3012,10 +3012,9 @@
           <a:lstStyle/>
           <a:p>
             <a:r>
-              <a:rPr lang="tr-TR" sz="4800" b="1" dirty="0" err="1"/>
+              <a:rPr lang="en-GB" sz="4800" b="1"/>
               <a:t>Terminology</a:t>
             </a:r>
-            <a:endParaRPr lang="tr-TR" sz="4800" b="1" dirty="0"/>
           </a:p>
         </p:txBody>
       </p:sp>
@@ -3061,7 +3060,7 @@
           <a:lstStyle/>
           <a:p>
             <a:pPr algn="ctr"/>
-            <a:endParaRPr lang="tr-TR"/>
+            <a:endParaRPr lang="en-GB"/>
           </a:p>
         </p:txBody>
       </p:sp>
@@ -3088,168 +3087,8 @@
           <a:lstStyle/>
           <a:p>
             <a:r>
-              <a:rPr lang="tr-TR" sz="2400" dirty="0"/>
-              <a:t>Through </a:t>
-            </a:r>
-            <a:r>
-              <a:rPr lang="tr-TR" sz="2400" dirty="0" err="1"/>
-              <a:t>out</a:t>
-            </a:r>
-            <a:r>
-              <a:rPr lang="tr-TR" sz="2400" dirty="0"/>
-              <a:t> </a:t>
-            </a:r>
-            <a:r>
-              <a:rPr lang="tr-TR" sz="2400" dirty="0" err="1"/>
-              <a:t>this</a:t>
-            </a:r>
-            <a:r>
-              <a:rPr lang="tr-TR" sz="2400" dirty="0"/>
-              <a:t> workshop </a:t>
-            </a:r>
-            <a:r>
-              <a:rPr lang="tr-TR" sz="2400" dirty="0" err="1"/>
-              <a:t>we</a:t>
-            </a:r>
-            <a:r>
-              <a:rPr lang="tr-TR" sz="2400" dirty="0"/>
-              <a:t> </a:t>
-            </a:r>
-            <a:r>
-              <a:rPr lang="tr-TR" sz="2400" dirty="0" err="1"/>
-              <a:t>will</a:t>
-            </a:r>
-            <a:r>
-              <a:rPr lang="tr-TR" sz="2400" dirty="0"/>
-              <a:t> be </a:t>
-            </a:r>
-            <a:r>
-              <a:rPr lang="tr-TR" sz="2400" dirty="0" err="1"/>
-              <a:t>using</a:t>
-            </a:r>
-            <a:r>
-              <a:rPr lang="tr-TR" sz="2400" dirty="0"/>
-              <a:t> ESM-Tools-</a:t>
-            </a:r>
-            <a:r>
-              <a:rPr lang="tr-TR" sz="2400" dirty="0" err="1"/>
-              <a:t>specific</a:t>
-            </a:r>
-            <a:r>
-              <a:rPr lang="tr-TR" sz="2400" dirty="0"/>
-              <a:t> </a:t>
-            </a:r>
-            <a:r>
-              <a:rPr lang="tr-TR" sz="2400" dirty="0" err="1"/>
-              <a:t>terms</a:t>
-            </a:r>
-            <a:r>
-              <a:rPr lang="tr-TR" sz="2400" dirty="0"/>
-              <a:t> </a:t>
-            </a:r>
-            <a:r>
-              <a:rPr lang="tr-TR" sz="2400" dirty="0" err="1"/>
-              <a:t>that</a:t>
-            </a:r>
-            <a:r>
-              <a:rPr lang="tr-TR" sz="2400" dirty="0"/>
-              <a:t> </a:t>
-            </a:r>
-            <a:r>
-              <a:rPr lang="tr-TR" sz="2400" dirty="0" err="1"/>
-              <a:t>you’ll</a:t>
-            </a:r>
-            <a:r>
-              <a:rPr lang="tr-TR" sz="2400" dirty="0"/>
-              <a:t> </a:t>
-            </a:r>
-            <a:r>
-              <a:rPr lang="tr-TR" sz="2400" dirty="0" err="1"/>
-              <a:t>need</a:t>
-            </a:r>
-            <a:r>
-              <a:rPr lang="tr-TR" sz="2400" dirty="0"/>
-              <a:t> </a:t>
-            </a:r>
-            <a:r>
-              <a:rPr lang="tr-TR" sz="2400" dirty="0" err="1"/>
-              <a:t>to</a:t>
-            </a:r>
-            <a:r>
-              <a:rPr lang="tr-TR" sz="2400" dirty="0"/>
-              <a:t> be </a:t>
-            </a:r>
-            <a:r>
-              <a:rPr lang="tr-TR" sz="2400" dirty="0" err="1"/>
-              <a:t>familiar</a:t>
-            </a:r>
-            <a:r>
-              <a:rPr lang="tr-TR" sz="2400" dirty="0"/>
-              <a:t> </a:t>
-            </a:r>
-            <a:r>
-              <a:rPr lang="tr-TR" sz="2400" dirty="0" err="1"/>
-              <a:t>with</a:t>
-            </a:r>
-            <a:r>
-              <a:rPr lang="tr-TR" sz="2400" dirty="0"/>
-              <a:t>. </a:t>
-            </a:r>
-            <a:r>
-              <a:rPr lang="tr-TR" sz="2400" dirty="0" err="1"/>
-              <a:t>Those</a:t>
-            </a:r>
-            <a:r>
-              <a:rPr lang="tr-TR" sz="2400" dirty="0"/>
-              <a:t> </a:t>
-            </a:r>
-            <a:r>
-              <a:rPr lang="tr-TR" sz="2400" dirty="0" err="1"/>
-              <a:t>terms</a:t>
-            </a:r>
-            <a:r>
-              <a:rPr lang="tr-TR" sz="2400" dirty="0"/>
-              <a:t> </a:t>
-            </a:r>
-            <a:r>
-              <a:rPr lang="tr-TR" sz="2400" dirty="0" err="1"/>
-              <a:t>are</a:t>
-            </a:r>
-            <a:r>
-              <a:rPr lang="tr-TR" sz="2400" dirty="0"/>
-              <a:t> </a:t>
-            </a:r>
-            <a:r>
-              <a:rPr lang="tr-TR" sz="2400" dirty="0" err="1"/>
-              <a:t>defined</a:t>
-            </a:r>
-            <a:r>
-              <a:rPr lang="tr-TR" sz="2400" dirty="0"/>
-              <a:t> in </a:t>
-            </a:r>
-            <a:r>
-              <a:rPr lang="tr-TR" sz="2400" dirty="0" err="1"/>
-              <a:t>this</a:t>
-            </a:r>
-            <a:r>
-              <a:rPr lang="tr-TR" sz="2400" dirty="0"/>
-              <a:t> </a:t>
-            </a:r>
-            <a:r>
-              <a:rPr lang="tr-TR" sz="2400" dirty="0" err="1"/>
-              <a:t>power</a:t>
-            </a:r>
-            <a:r>
-              <a:rPr lang="tr-TR" sz="2400" dirty="0"/>
-              <a:t> </a:t>
-            </a:r>
-            <a:r>
-              <a:rPr lang="tr-TR" sz="2400" dirty="0" err="1"/>
-              <a:t>point</a:t>
-            </a:r>
-            <a:r>
-              <a:rPr lang="tr-TR" sz="2400" dirty="0"/>
-              <a:t>. </a:t>
+              <a:rPr lang="en-GB" sz="2400"/>
+              <a:t>Through out this workshop we will be using ESM-Tools-specific terms that you’ll need to be familiar with. Those terms are defined in this power point. </a:t>
             </a:r>
           </a:p>
         </p:txBody>
@@ -3302,7 +3141,7 @@
           <a:lstStyle/>
           <a:p>
             <a:pPr algn="ctr"/>
-            <a:endParaRPr lang="tr-TR"/>
+            <a:endParaRPr lang="en-GB"/>
           </a:p>
         </p:txBody>
       </p:sp>
@@ -3335,82 +3174,17 @@
           <a:lstStyle/>
           <a:p>
             <a:r>
-              <a:rPr lang="tr-TR" sz="2400" dirty="0" err="1"/>
-              <a:t>You’ll</a:t>
-            </a:r>
-            <a:r>
-              <a:rPr lang="tr-TR" sz="2400" dirty="0"/>
-              <a:t> </a:t>
-            </a:r>
-            <a:r>
-              <a:rPr lang="tr-TR" sz="2400" dirty="0" err="1"/>
-              <a:t>see</a:t>
-            </a:r>
-            <a:r>
-              <a:rPr lang="tr-TR" sz="2400" dirty="0"/>
-              <a:t> </a:t>
-            </a:r>
-            <a:r>
-              <a:rPr lang="tr-TR" sz="2400" dirty="0" err="1"/>
-              <a:t>those</a:t>
-            </a:r>
-            <a:r>
-              <a:rPr lang="tr-TR" sz="2400" dirty="0"/>
-              <a:t> </a:t>
-            </a:r>
-            <a:r>
-              <a:rPr lang="tr-TR" sz="2400" dirty="0" err="1"/>
-              <a:t>terms</a:t>
-            </a:r>
-            <a:r>
-              <a:rPr lang="tr-TR" sz="2400" dirty="0"/>
-              <a:t> in </a:t>
-            </a:r>
-            <a:r>
-              <a:rPr lang="tr-TR" sz="2400" dirty="0" err="1"/>
-              <a:t>the</a:t>
-            </a:r>
-            <a:r>
-              <a:rPr lang="tr-TR" sz="2400" dirty="0"/>
-              <a:t> </a:t>
-            </a:r>
-            <a:r>
-              <a:rPr lang="tr-TR" sz="2400" dirty="0" err="1"/>
-              <a:t>other</a:t>
-            </a:r>
-            <a:r>
-              <a:rPr lang="tr-TR" sz="2400" dirty="0"/>
-              <a:t> </a:t>
-            </a:r>
-            <a:r>
-              <a:rPr lang="tr-TR" sz="2400" dirty="0" err="1"/>
-              <a:t>slides</a:t>
-            </a:r>
-            <a:r>
-              <a:rPr lang="tr-TR" sz="2400" dirty="0"/>
-              <a:t> </a:t>
-            </a:r>
-            <a:r>
-              <a:rPr lang="tr-TR" sz="2400" dirty="0" err="1"/>
-              <a:t>colored</a:t>
-            </a:r>
-            <a:r>
-              <a:rPr lang="tr-TR" sz="2400" dirty="0"/>
-              <a:t> in </a:t>
-            </a:r>
-            <a:r>
-              <a:rPr lang="tr-TR" sz="2400" dirty="0" err="1">
+              <a:rPr lang="en-GB" sz="2400"/>
+              <a:t>You’ll see those terms in the other slides colored in </a:t>
+            </a:r>
+            <a:r>
+              <a:rPr lang="en-GB" sz="2400">
                 <a:solidFill>
                   <a:srgbClr val="ED7D31"/>
                 </a:solidFill>
               </a:rPr>
               <a:t>orange</a:t>
             </a:r>
-            <a:endParaRPr lang="tr-TR" sz="2400" dirty="0">
-              <a:solidFill>
-                <a:srgbClr val="ED7D31"/>
-              </a:solidFill>
-            </a:endParaRPr>
           </a:p>
         </p:txBody>
       </p:sp>
@@ -3486,26 +3260,9 @@
           <a:lstStyle/>
           <a:p>
             <a:r>
-              <a:rPr lang="tr-TR" sz="4800" b="1" dirty="0" err="1"/>
-              <a:t>Terminology</a:t>
-            </a:r>
-            <a:r>
-              <a:rPr lang="tr-TR" sz="4800" b="1" dirty="0"/>
-              <a:t> - </a:t>
-            </a:r>
-            <a:r>
-              <a:rPr lang="tr-TR" sz="4800" b="1" dirty="0" err="1"/>
-              <a:t>configuration</a:t>
-            </a:r>
-            <a:r>
-              <a:rPr lang="tr-TR" sz="4800" b="1" dirty="0"/>
-              <a:t> </a:t>
-            </a:r>
-            <a:r>
-              <a:rPr lang="tr-TR" sz="4800" b="1" dirty="0" err="1"/>
-              <a:t>files</a:t>
-            </a:r>
-            <a:endParaRPr lang="tr-TR" sz="4800" b="1" dirty="0"/>
+              <a:rPr lang="en-GB" sz="4800" b="1"/>
+              <a:t>Terminology - configuration files</a:t>
+            </a:r>
           </a:p>
         </p:txBody>
       </p:sp>
@@ -3551,7 +3308,7 @@
           <a:lstStyle/>
           <a:p>
             <a:pPr algn="ctr"/>
-            <a:endParaRPr lang="tr-TR"/>
+            <a:endParaRPr lang="en-GB"/>
           </a:p>
         </p:txBody>
       </p:sp>
@@ -3578,193 +3335,43 @@
           <a:lstStyle/>
           <a:p>
             <a:r>
-              <a:rPr lang="tr-TR" sz="2400" dirty="0" err="1"/>
-              <a:t>The</a:t>
-            </a:r>
-            <a:r>
-              <a:rPr lang="tr-TR" sz="2400" dirty="0"/>
-              <a:t> </a:t>
-            </a:r>
-            <a:r>
-              <a:rPr lang="tr-TR" sz="2400" dirty="0" err="1"/>
-              <a:t>yaml</a:t>
-            </a:r>
-            <a:r>
-              <a:rPr lang="tr-TR" sz="2400" dirty="0"/>
-              <a:t> </a:t>
-            </a:r>
-            <a:r>
-              <a:rPr lang="tr-TR" sz="2400" dirty="0" err="1"/>
-              <a:t>files</a:t>
-            </a:r>
-            <a:r>
-              <a:rPr lang="tr-TR" sz="2400" dirty="0"/>
-              <a:t> </a:t>
-            </a:r>
-            <a:r>
-              <a:rPr lang="tr-TR" sz="2400" dirty="0" err="1"/>
-              <a:t>that</a:t>
-            </a:r>
-            <a:r>
-              <a:rPr lang="tr-TR" sz="2400" dirty="0"/>
-              <a:t> </a:t>
-            </a:r>
-            <a:r>
-              <a:rPr lang="tr-TR" sz="2400" dirty="0" err="1"/>
-              <a:t>contain</a:t>
-            </a:r>
-            <a:r>
-              <a:rPr lang="tr-TR" sz="2400" dirty="0"/>
-              <a:t> </a:t>
-            </a:r>
-            <a:r>
-              <a:rPr lang="tr-TR" sz="2400" dirty="0" err="1"/>
-              <a:t>the</a:t>
-            </a:r>
-            <a:r>
-              <a:rPr lang="tr-TR" sz="2400" dirty="0"/>
-              <a:t> </a:t>
-            </a:r>
-            <a:r>
-              <a:rPr lang="tr-TR" sz="2400" b="1" dirty="0" err="1">
+              <a:rPr lang="en-GB" sz="2400"/>
+              <a:t>The yaml files that contain the </a:t>
+            </a:r>
+            <a:r>
+              <a:rPr lang="en-GB" sz="2400" b="1">
                 <a:solidFill>
                   <a:srgbClr val="31ACE6"/>
                 </a:solidFill>
               </a:rPr>
-              <a:t>default</a:t>
-            </a:r>
-            <a:r>
-              <a:rPr lang="tr-TR" sz="2400" b="1" dirty="0">
-                <a:solidFill>
-                  <a:srgbClr val="31ACE6"/>
-                </a:solidFill>
-              </a:rPr>
-              <a:t> </a:t>
-            </a:r>
-            <a:r>
-              <a:rPr lang="tr-TR" sz="2400" b="1" dirty="0" err="1">
-                <a:solidFill>
-                  <a:srgbClr val="31ACE6"/>
-                </a:solidFill>
-              </a:rPr>
-              <a:t>configurations</a:t>
-            </a:r>
-            <a:r>
-              <a:rPr lang="tr-TR" sz="2400" dirty="0"/>
-              <a:t> </a:t>
-            </a:r>
-            <a:r>
-              <a:rPr lang="tr-TR" sz="2400" dirty="0" err="1"/>
-              <a:t>for</a:t>
-            </a:r>
-            <a:r>
-              <a:rPr lang="tr-TR" sz="2400" dirty="0"/>
-              <a:t> </a:t>
-            </a:r>
-            <a:r>
-              <a:rPr lang="tr-TR" sz="2400" dirty="0" err="1"/>
-              <a:t>HPCs</a:t>
-            </a:r>
-            <a:r>
-              <a:rPr lang="tr-TR" sz="2400" dirty="0"/>
-              <a:t>, </a:t>
-            </a:r>
-            <a:r>
-              <a:rPr lang="tr-TR" sz="2400" dirty="0" err="1"/>
-              <a:t>models</a:t>
-            </a:r>
-            <a:r>
-              <a:rPr lang="tr-TR" sz="2400" dirty="0"/>
-              <a:t>, </a:t>
-            </a:r>
-            <a:r>
-              <a:rPr lang="tr-TR" sz="2400" dirty="0" err="1"/>
-              <a:t>coupled</a:t>
-            </a:r>
-            <a:r>
-              <a:rPr lang="tr-TR" sz="2400" dirty="0"/>
-              <a:t> </a:t>
-            </a:r>
-            <a:r>
-              <a:rPr lang="tr-TR" sz="2400" dirty="0" err="1"/>
-              <a:t>systems</a:t>
-            </a:r>
-            <a:r>
-              <a:rPr lang="tr-TR" sz="2400" dirty="0"/>
-              <a:t>, </a:t>
-            </a:r>
-            <a:r>
-              <a:rPr lang="tr-TR" sz="2400" dirty="0" err="1"/>
-              <a:t>job</a:t>
-            </a:r>
-            <a:r>
-              <a:rPr lang="tr-TR" sz="2400" dirty="0"/>
-              <a:t> </a:t>
-            </a:r>
-            <a:r>
-              <a:rPr lang="tr-TR" sz="2400" dirty="0" err="1"/>
-              <a:t>schedulers</a:t>
-            </a:r>
-            <a:r>
-              <a:rPr lang="tr-TR" sz="2400" dirty="0"/>
-              <a:t> (SLURM, PBS), </a:t>
-            </a:r>
-            <a:r>
-              <a:rPr lang="tr-TR" sz="2400" dirty="0" err="1"/>
-              <a:t>default</a:t>
-            </a:r>
-            <a:r>
-              <a:rPr lang="tr-TR" sz="2400" dirty="0"/>
-              <a:t> ESM-Tools </a:t>
-            </a:r>
-            <a:r>
-              <a:rPr lang="tr-TR" sz="2400" dirty="0" err="1"/>
-              <a:t>recipes</a:t>
-            </a:r>
-            <a:r>
-              <a:rPr lang="tr-TR" sz="2400" dirty="0"/>
-              <a:t>, …</a:t>
-            </a:r>
-          </a:p>
-          <a:p>
-            <a:endParaRPr lang="tr-TR" sz="2400" dirty="0"/>
-          </a:p>
-          <a:p>
-            <a:r>
-              <a:rPr lang="tr-TR" dirty="0" err="1">
+              <a:t>default configurations</a:t>
+            </a:r>
+            <a:r>
+              <a:rPr lang="en-GB" sz="2400"/>
+              <a:t> for HPCs, models, coupled systems, job schedulers (SLURM, PBS), default ESM-Tools recipes, …</a:t>
+            </a:r>
+          </a:p>
+          <a:p>
+            <a:endParaRPr lang="en-GB" sz="2400"/>
+          </a:p>
+          <a:p>
+            <a:r>
+              <a:rPr lang="en-GB">
                 <a:latin typeface="Monaco" pitchFamily="2" charset="77"/>
               </a:rPr>
-              <a:t>esm_tools</a:t>
-            </a:r>
-            <a:r>
-              <a:rPr lang="tr-TR" dirty="0">
-                <a:latin typeface="Monaco" pitchFamily="2" charset="77"/>
-              </a:rPr>
-              <a:t>/</a:t>
-            </a:r>
-            <a:r>
-              <a:rPr lang="tr-TR" dirty="0" err="1">
-                <a:latin typeface="Monaco" pitchFamily="2" charset="77"/>
-              </a:rPr>
-              <a:t>configs</a:t>
-            </a:r>
-            <a:r>
-              <a:rPr lang="tr-TR" dirty="0">
-                <a:latin typeface="Monaco" pitchFamily="2" charset="77"/>
-              </a:rPr>
-              <a:t>/</a:t>
-            </a:r>
-            <a:endParaRPr lang="tr-TR" sz="2400" dirty="0">
+              <a:t>esm_tools/configs/</a:t>
+            </a:r>
+            <a:endParaRPr lang="en-GB" sz="2400">
               <a:latin typeface="Monaco" pitchFamily="2" charset="77"/>
             </a:endParaRPr>
           </a:p>
           <a:p>
             <a:r>
-              <a:rPr lang="tr-TR" sz="2400" dirty="0"/>
+              <a:rPr lang="en-GB" sz="2400"/>
               <a:t>	</a:t>
             </a:r>
             <a:r>
-              <a:rPr lang="tr-TR" sz="2000" b="1" dirty="0" err="1">
+              <a:rPr lang="en-GB" sz="2000" b="1">
                 <a:solidFill>
                   <a:srgbClr val="31ACE6"/>
                 </a:solidFill>
@@ -3773,46 +3380,17 @@
               <a:t>components</a:t>
             </a:r>
             <a:r>
-              <a:rPr lang="tr-TR" sz="2400" dirty="0"/>
-              <a:t>    		</a:t>
-            </a:r>
-            <a:r>
-              <a:rPr lang="tr-TR" sz="2400" dirty="0" err="1"/>
-              <a:t>Stand-alone</a:t>
-            </a:r>
-            <a:r>
-              <a:rPr lang="tr-TR" sz="2400" dirty="0"/>
-              <a:t> model, </a:t>
-            </a:r>
-            <a:r>
-              <a:rPr lang="tr-TR" sz="2400" dirty="0" err="1"/>
-              <a:t>couplers</a:t>
-            </a:r>
-            <a:r>
-              <a:rPr lang="tr-TR" sz="2400" dirty="0"/>
-              <a:t>, I/O </a:t>
-            </a:r>
-            <a:r>
-              <a:rPr lang="tr-TR" sz="2400" dirty="0" err="1"/>
-              <a:t>libraries</a:t>
-            </a:r>
-            <a:r>
-              <a:rPr lang="tr-TR" sz="2400" dirty="0"/>
-              <a:t> </a:t>
-            </a:r>
-            <a:r>
-              <a:rPr lang="tr-TR" sz="2400" dirty="0" err="1"/>
-              <a:t>configurations</a:t>
-            </a:r>
-            <a:endParaRPr lang="tr-TR" sz="2400" dirty="0"/>
-          </a:p>
-          <a:p>
-            <a:r>
-              <a:rPr lang="tr-TR" sz="2400" dirty="0"/>
+              <a:rPr lang="en-GB" sz="2400"/>
+              <a:t>    		Stand-alone model, couplers, I/O libraries configurations</a:t>
+            </a:r>
+          </a:p>
+          <a:p>
+            <a:r>
+              <a:rPr lang="en-GB" sz="2400"/>
               <a:t>	</a:t>
             </a:r>
             <a:r>
-              <a:rPr lang="tr-TR" sz="2000" b="1" dirty="0" err="1">
+              <a:rPr lang="en-GB" sz="2000" b="1">
                 <a:solidFill>
                   <a:srgbClr val="31ACE6"/>
                 </a:solidFill>
@@ -3821,46 +3399,17 @@
               <a:t>setups</a:t>
             </a:r>
             <a:r>
-              <a:rPr lang="tr-TR" sz="2400" dirty="0"/>
-              <a:t> 		</a:t>
-            </a:r>
-            <a:r>
-              <a:rPr lang="tr-TR" sz="2400" dirty="0" err="1"/>
-              <a:t>Coupled</a:t>
-            </a:r>
-            <a:r>
-              <a:rPr lang="tr-TR" sz="2400" dirty="0"/>
-              <a:t> </a:t>
-            </a:r>
-            <a:r>
-              <a:rPr lang="tr-TR" sz="2400" dirty="0" err="1"/>
-              <a:t>system</a:t>
-            </a:r>
-            <a:r>
-              <a:rPr lang="tr-TR" sz="2400" dirty="0"/>
-              <a:t> </a:t>
-            </a:r>
-            <a:r>
-              <a:rPr lang="tr-TR" sz="2400" dirty="0" err="1"/>
-              <a:t>default</a:t>
-            </a:r>
-            <a:r>
-              <a:rPr lang="tr-TR" sz="2400" dirty="0"/>
-              <a:t> </a:t>
-            </a:r>
-            <a:r>
-              <a:rPr lang="tr-TR" sz="2400" dirty="0" err="1"/>
-              <a:t>configurations</a:t>
-            </a:r>
-            <a:endParaRPr lang="tr-TR" sz="2400" dirty="0"/>
-          </a:p>
-          <a:p>
-            <a:r>
-              <a:rPr lang="tr-TR" sz="2400" dirty="0"/>
+              <a:rPr lang="en-GB" sz="2400"/>
+              <a:t> 		Coupled system default configurations</a:t>
+            </a:r>
+          </a:p>
+          <a:p>
+            <a:r>
+              <a:rPr lang="en-GB" sz="2400"/>
               <a:t>	</a:t>
             </a:r>
             <a:r>
-              <a:rPr lang="tr-TR" sz="2000" b="1" dirty="0" err="1">
+              <a:rPr lang="en-GB" sz="2000" b="1">
                 <a:solidFill>
                   <a:srgbClr val="31ACE6"/>
                 </a:solidFill>
@@ -3869,319 +3418,85 @@
               <a:t>machines</a:t>
             </a:r>
             <a:r>
-              <a:rPr lang="tr-TR" sz="2400" dirty="0"/>
-              <a:t>		HPC </a:t>
-            </a:r>
-            <a:r>
-              <a:rPr lang="tr-TR" sz="2400" dirty="0" err="1"/>
-              <a:t>default</a:t>
-            </a:r>
-            <a:r>
-              <a:rPr lang="tr-TR" sz="2400" dirty="0"/>
-              <a:t> </a:t>
-            </a:r>
-            <a:r>
-              <a:rPr lang="tr-TR" sz="2400" dirty="0" err="1"/>
-              <a:t>configurations</a:t>
-            </a:r>
-            <a:endParaRPr lang="tr-TR" sz="2400" dirty="0"/>
-          </a:p>
-          <a:p>
-            <a:r>
-              <a:rPr lang="tr-TR" sz="2400" dirty="0"/>
+              <a:rPr lang="en-GB" sz="2400"/>
+              <a:t>		HPC default configurations</a:t>
+            </a:r>
+          </a:p>
+          <a:p>
+            <a:r>
+              <a:rPr lang="en-GB" sz="2400"/>
               <a:t>	</a:t>
             </a:r>
             <a:r>
-              <a:rPr lang="tr-TR" sz="2000" dirty="0" err="1">
+              <a:rPr lang="en-GB" sz="2000">
                 <a:latin typeface="Monaco" pitchFamily="2" charset="77"/>
               </a:rPr>
               <a:t>coupling</a:t>
             </a:r>
             <a:r>
-              <a:rPr lang="tr-TR" sz="2400" dirty="0"/>
-              <a:t>		Source </a:t>
-            </a:r>
-            <a:r>
-              <a:rPr lang="tr-TR" sz="2400" dirty="0" err="1"/>
-              <a:t>code</a:t>
-            </a:r>
-            <a:r>
-              <a:rPr lang="tr-TR" sz="2400" dirty="0"/>
-              <a:t> </a:t>
-            </a:r>
-            <a:r>
-              <a:rPr lang="tr-TR" sz="2400" dirty="0" err="1"/>
-              <a:t>branch</a:t>
-            </a:r>
-            <a:r>
-              <a:rPr lang="tr-TR" sz="2400" dirty="0"/>
-              <a:t> </a:t>
-            </a:r>
-            <a:r>
-              <a:rPr lang="tr-TR" sz="2400" dirty="0" err="1"/>
-              <a:t>information</a:t>
-            </a:r>
-            <a:r>
-              <a:rPr lang="tr-TR" sz="2400" dirty="0"/>
-              <a:t> </a:t>
-            </a:r>
-            <a:r>
-              <a:rPr lang="tr-TR" sz="2400" dirty="0" err="1"/>
-              <a:t>for</a:t>
-            </a:r>
-            <a:r>
-              <a:rPr lang="tr-TR" sz="2400" dirty="0"/>
-              <a:t> </a:t>
-            </a:r>
-            <a:r>
-              <a:rPr lang="tr-TR" sz="2400" dirty="0" err="1"/>
-              <a:t>coupled</a:t>
-            </a:r>
-            <a:r>
-              <a:rPr lang="tr-TR" sz="2400" dirty="0"/>
-              <a:t> </a:t>
-            </a:r>
-            <a:r>
-              <a:rPr lang="tr-TR" sz="2400" dirty="0" err="1"/>
-              <a:t>system</a:t>
-            </a:r>
-            <a:endParaRPr lang="tr-TR" sz="2400" dirty="0"/>
-          </a:p>
-          <a:p>
-            <a:r>
-              <a:rPr lang="tr-TR" sz="2400" dirty="0"/>
-              <a:t>				</a:t>
-            </a:r>
-            <a:r>
-              <a:rPr lang="tr-TR" sz="2400" dirty="0" err="1"/>
-              <a:t>stored</a:t>
-            </a:r>
-            <a:r>
-              <a:rPr lang="tr-TR" sz="2400" dirty="0"/>
-              <a:t> here, </a:t>
-            </a:r>
-            <a:r>
-              <a:rPr lang="tr-TR" sz="2400" dirty="0" err="1"/>
-              <a:t>only</a:t>
-            </a:r>
-            <a:r>
-              <a:rPr lang="tr-TR" sz="2400" dirty="0"/>
-              <a:t> </a:t>
-            </a:r>
-            <a:r>
-              <a:rPr lang="tr-TR" sz="2400" dirty="0" err="1"/>
-              <a:t>for</a:t>
-            </a:r>
-            <a:r>
-              <a:rPr lang="tr-TR" sz="2400" dirty="0"/>
-              <a:t> </a:t>
-            </a:r>
-            <a:r>
-              <a:rPr lang="tr-TR" sz="2400" dirty="0" err="1"/>
-              <a:t>use</a:t>
-            </a:r>
-            <a:r>
-              <a:rPr lang="tr-TR" sz="2400" dirty="0"/>
-              <a:t> in ESM-Master (</a:t>
-            </a:r>
-            <a:r>
-              <a:rPr lang="tr-TR" sz="2400" dirty="0" err="1"/>
-              <a:t>to</a:t>
-            </a:r>
-            <a:r>
-              <a:rPr lang="tr-TR" sz="2400" dirty="0"/>
-              <a:t> be </a:t>
-            </a:r>
-            <a:r>
-              <a:rPr lang="tr-TR" sz="2400" dirty="0" err="1"/>
-              <a:t>removed</a:t>
-            </a:r>
-            <a:r>
-              <a:rPr lang="tr-TR" sz="2400" dirty="0"/>
-              <a:t> in</a:t>
-            </a:r>
-          </a:p>
-          <a:p>
-            <a:r>
-              <a:rPr lang="tr-TR" sz="2400" dirty="0"/>
-              <a:t>				</a:t>
-            </a:r>
-            <a:r>
-              <a:rPr lang="tr-TR" sz="2400" dirty="0" err="1"/>
-              <a:t>the</a:t>
-            </a:r>
-            <a:r>
-              <a:rPr lang="tr-TR" sz="2400" dirty="0"/>
-              <a:t> </a:t>
-            </a:r>
-            <a:r>
-              <a:rPr lang="tr-TR" sz="2400" dirty="0" err="1"/>
-              <a:t>future</a:t>
-            </a:r>
-            <a:r>
-              <a:rPr lang="tr-TR" sz="2400" dirty="0"/>
-              <a:t>)</a:t>
-            </a:r>
-          </a:p>
-          <a:p>
-            <a:r>
-              <a:rPr lang="tr-TR" sz="2400" dirty="0"/>
+              <a:rPr lang="en-GB" sz="2400"/>
+              <a:t>		Source code branch information for coupled system</a:t>
+            </a:r>
+          </a:p>
+          <a:p>
+            <a:r>
+              <a:rPr lang="en-GB" sz="2400"/>
+              <a:t>				stored here, only for use in ESM-Master (to be removed in</a:t>
+            </a:r>
+          </a:p>
+          <a:p>
+            <a:r>
+              <a:rPr lang="en-GB" sz="2400"/>
+              <a:t>				the future)</a:t>
+            </a:r>
+          </a:p>
+          <a:p>
+            <a:r>
+              <a:rPr lang="en-GB" sz="2400"/>
               <a:t>	</a:t>
             </a:r>
             <a:r>
-              <a:rPr lang="tr-TR" sz="2000" dirty="0" err="1">
+              <a:rPr lang="en-GB" sz="2000">
                 <a:latin typeface="Monaco" pitchFamily="2" charset="77"/>
               </a:rPr>
               <a:t>default</a:t>
             </a:r>
             <a:r>
-              <a:rPr lang="tr-TR" sz="2400" dirty="0"/>
-              <a:t> 		ESM-Tools </a:t>
-            </a:r>
-            <a:r>
-              <a:rPr lang="tr-TR" sz="2400" dirty="0" err="1"/>
-              <a:t>default</a:t>
-            </a:r>
-            <a:r>
-              <a:rPr lang="tr-TR" sz="2400" dirty="0"/>
-              <a:t> </a:t>
-            </a:r>
-            <a:r>
-              <a:rPr lang="tr-TR" sz="2400" dirty="0" err="1"/>
-              <a:t>configurations</a:t>
-            </a:r>
-            <a:endParaRPr lang="tr-TR" sz="2400" dirty="0"/>
-          </a:p>
-          <a:p>
-            <a:r>
-              <a:rPr lang="tr-TR" sz="2400" dirty="0"/>
+              <a:rPr lang="en-GB" sz="2400"/>
+              <a:t> 		ESM-Tools default configurations</a:t>
+            </a:r>
+          </a:p>
+          <a:p>
+            <a:r>
+              <a:rPr lang="en-GB" sz="2400"/>
               <a:t>	</a:t>
             </a:r>
             <a:r>
-              <a:rPr lang="tr-TR" sz="2000" dirty="0" err="1">
+              <a:rPr lang="en-GB" sz="2000">
                 <a:latin typeface="Monaco" pitchFamily="2" charset="77"/>
               </a:rPr>
-              <a:t>esm_software</a:t>
-            </a:r>
-            <a:r>
-              <a:rPr lang="tr-TR" sz="2000" dirty="0">
-                <a:latin typeface="Monaco" pitchFamily="2" charset="77"/>
-              </a:rPr>
-              <a:t> </a:t>
-            </a:r>
-            <a:r>
-              <a:rPr lang="tr-TR" sz="2400" dirty="0"/>
+              <a:t>esm_software </a:t>
+            </a:r>
+            <a:r>
+              <a:rPr lang="en-GB" sz="2400"/>
+              <a:t>	Recipes and defaults for ESM-Runscripts and ESM-Master</a:t>
+            </a:r>
+          </a:p>
+          <a:p>
+            <a:r>
+              <a:rPr lang="en-GB" sz="2400"/>
               <a:t>	</a:t>
             </a:r>
             <a:r>
-              <a:rPr lang="tr-TR" sz="2400" dirty="0" err="1"/>
-              <a:t>Recipes</a:t>
-            </a:r>
-            <a:r>
-              <a:rPr lang="tr-TR" sz="2400" dirty="0"/>
-              <a:t> </a:t>
-            </a:r>
-            <a:r>
-              <a:rPr lang="tr-TR" sz="2400" dirty="0" err="1"/>
-              <a:t>and</a:t>
-            </a:r>
-            <a:r>
-              <a:rPr lang="tr-TR" sz="2400" dirty="0"/>
-              <a:t> </a:t>
-            </a:r>
-            <a:r>
-              <a:rPr lang="tr-TR" sz="2400" dirty="0" err="1"/>
-              <a:t>defaults</a:t>
-            </a:r>
-            <a:r>
-              <a:rPr lang="tr-TR" sz="2400" dirty="0"/>
-              <a:t> </a:t>
-            </a:r>
-            <a:r>
-              <a:rPr lang="tr-TR" sz="2400" dirty="0" err="1"/>
-              <a:t>for</a:t>
-            </a:r>
-            <a:r>
-              <a:rPr lang="tr-TR" sz="2400" dirty="0"/>
-              <a:t> ESM-</a:t>
-            </a:r>
-            <a:r>
-              <a:rPr lang="tr-TR" sz="2400" dirty="0" err="1"/>
-              <a:t>Runscripts</a:t>
-            </a:r>
-            <a:r>
-              <a:rPr lang="tr-TR" sz="2400" dirty="0"/>
-              <a:t> </a:t>
-            </a:r>
-            <a:r>
-              <a:rPr lang="tr-TR" sz="2400" dirty="0" err="1"/>
-              <a:t>and</a:t>
-            </a:r>
-            <a:r>
-              <a:rPr lang="tr-TR" sz="2400" dirty="0"/>
-              <a:t> ESM-Master</a:t>
-            </a:r>
-          </a:p>
-          <a:p>
-            <a:r>
-              <a:rPr lang="tr-TR" sz="2400" dirty="0"/>
-              <a:t>	</a:t>
-            </a:r>
-            <a:r>
-              <a:rPr lang="tr-TR" sz="2000" dirty="0" err="1">
+              <a:rPr lang="en-GB" sz="2000">
                 <a:latin typeface="Monaco" pitchFamily="2" charset="77"/>
               </a:rPr>
               <a:t>other_software</a:t>
             </a:r>
             <a:r>
-              <a:rPr lang="tr-TR" sz="2400" dirty="0"/>
-              <a:t>	</a:t>
-            </a:r>
-            <a:r>
-              <a:rPr lang="tr-TR" sz="2400" dirty="0" err="1"/>
-              <a:t>Job</a:t>
-            </a:r>
-            <a:r>
-              <a:rPr lang="tr-TR" sz="2400" dirty="0"/>
-              <a:t> </a:t>
-            </a:r>
-            <a:r>
-              <a:rPr lang="tr-TR" sz="2400" dirty="0" err="1"/>
-              <a:t>schedulers</a:t>
-            </a:r>
-            <a:r>
-              <a:rPr lang="tr-TR" sz="2400" dirty="0"/>
-              <a:t> </a:t>
-            </a:r>
-            <a:r>
-              <a:rPr lang="tr-TR" sz="2400" dirty="0" err="1"/>
-              <a:t>and</a:t>
-            </a:r>
-            <a:r>
-              <a:rPr lang="tr-TR" sz="2400" dirty="0"/>
-              <a:t> </a:t>
-            </a:r>
-            <a:r>
-              <a:rPr lang="tr-TR" sz="2400" dirty="0" err="1"/>
-              <a:t>other</a:t>
-            </a:r>
-            <a:r>
-              <a:rPr lang="tr-TR" sz="2400" dirty="0"/>
-              <a:t> </a:t>
-            </a:r>
-            <a:r>
-              <a:rPr lang="tr-TR" sz="2400" dirty="0" err="1"/>
-              <a:t>external</a:t>
-            </a:r>
-            <a:r>
-              <a:rPr lang="tr-TR" sz="2400" dirty="0"/>
-              <a:t> software </a:t>
-            </a:r>
-            <a:r>
-              <a:rPr lang="tr-TR" sz="2400" dirty="0" err="1"/>
-              <a:t>configurations</a:t>
-            </a:r>
-            <a:endParaRPr lang="tr-TR" sz="2400" dirty="0"/>
+              <a:rPr lang="en-GB" sz="2400"/>
+              <a:t>	Job schedulers and other external software configurations</a:t>
+            </a:r>
           </a:p>
         </p:txBody>
       </p:sp>

</xml_diff>